<commit_message>
FILTERS & USER AUTHENTICATION
</commit_message>
<xml_diff>
--- a/07. THYMELEAF & CONTROLLERS/04. Java-MVC-Frameworks-Thymeleaf-and-Controllers.pptx
+++ b/07. THYMELEAF & CONTROLLERS/04. Java-MVC-Frameworks-Thymeleaf-and-Controllers.pptx
@@ -317,7 +317,7 @@
           <a:p>
             <a:fld id="{4E087215-0C8F-4762-A664-737A353EC9A4}" type="datetimeFigureOut">
               <a:rPr lang="bg-BG" smtClean="0"/>
-              <a:t>11.3.2019 г.</a:t>
+              <a:t>16.3.2019 г.</a:t>
             </a:fld>
             <a:endParaRPr lang="bg-BG" dirty="0"/>
           </a:p>
@@ -494,7 +494,7 @@
           <a:p>
             <a:fld id="{72D84649-876A-46C9-8472-14CB09C070D8}" type="datetimeFigureOut">
               <a:rPr lang="en-US" smtClean="0"/>
-              <a:t>3/11/2019</a:t>
+              <a:t>3/16/2019</a:t>
             </a:fld>
             <a:endParaRPr lang="en-US" dirty="0"/>
           </a:p>
@@ -3060,7 +3060,7 @@
             <a:fld id="{055373AC-9AA7-423B-BA00-BA1C74164DBD}" type="datetime1">
               <a:rPr lang="en-US" smtClean="0"/>
               <a:pPr/>
-              <a:t>3/11/2019</a:t>
+              <a:t>3/16/2019</a:t>
             </a:fld>
             <a:endParaRPr lang="en-US" dirty="0"/>
           </a:p>
@@ -3538,7 +3538,7 @@
             <a:fld id="{055373AC-9AA7-423B-BA00-BA1C74164DBD}" type="datetime1">
               <a:rPr lang="en-US" smtClean="0"/>
               <a:pPr/>
-              <a:t>3/11/2019</a:t>
+              <a:t>3/16/2019</a:t>
             </a:fld>
             <a:endParaRPr lang="en-US" dirty="0"/>
           </a:p>
@@ -4896,7 +4896,7 @@
             <a:fld id="{055373AC-9AA7-423B-BA00-BA1C74164DBD}" type="datetime1">
               <a:rPr lang="en-US" smtClean="0"/>
               <a:pPr/>
-              <a:t>3/11/2019</a:t>
+              <a:t>3/16/2019</a:t>
             </a:fld>
             <a:endParaRPr lang="en-US" dirty="0"/>
           </a:p>
@@ -6934,7 +6934,7 @@
             <a:fld id="{055373AC-9AA7-423B-BA00-BA1C74164DBD}" type="datetime1">
               <a:rPr lang="en-US" smtClean="0"/>
               <a:pPr/>
-              <a:t>3/11/2019</a:t>
+              <a:t>3/16/2019</a:t>
             </a:fld>
             <a:endParaRPr lang="en-US" dirty="0"/>
           </a:p>
@@ -7257,7 +7257,7 @@
             <a:fld id="{055373AC-9AA7-423B-BA00-BA1C74164DBD}" type="datetime1">
               <a:rPr lang="en-US" smtClean="0"/>
               <a:pPr/>
-              <a:t>3/11/2019</a:t>
+              <a:t>3/16/2019</a:t>
             </a:fld>
             <a:endParaRPr lang="en-US" dirty="0"/>
           </a:p>
@@ -7580,7 +7580,7 @@
             <a:fld id="{055373AC-9AA7-423B-BA00-BA1C74164DBD}" type="datetime1">
               <a:rPr lang="en-US" smtClean="0"/>
               <a:pPr/>
-              <a:t>3/11/2019</a:t>
+              <a:t>3/16/2019</a:t>
             </a:fld>
             <a:endParaRPr lang="en-US" dirty="0"/>
           </a:p>
@@ -8154,7 +8154,7 @@
             <a:fld id="{055373AC-9AA7-423B-BA00-BA1C74164DBD}" type="datetime1">
               <a:rPr lang="en-US" smtClean="0"/>
               <a:pPr/>
-              <a:t>3/11/2019</a:t>
+              <a:t>3/16/2019</a:t>
             </a:fld>
             <a:endParaRPr lang="en-US" dirty="0"/>
           </a:p>
@@ -8304,7 +8304,7 @@
             <a:fld id="{055373AC-9AA7-423B-BA00-BA1C74164DBD}" type="datetime1">
               <a:rPr lang="en-US" smtClean="0"/>
               <a:pPr/>
-              <a:t>3/11/2019</a:t>
+              <a:t>3/16/2019</a:t>
             </a:fld>
             <a:endParaRPr lang="en-US" dirty="0"/>
           </a:p>
@@ -8627,7 +8627,7 @@
             <a:fld id="{055373AC-9AA7-423B-BA00-BA1C74164DBD}" type="datetime1">
               <a:rPr lang="en-US" smtClean="0"/>
               <a:pPr/>
-              <a:t>3/11/2019</a:t>
+              <a:t>3/16/2019</a:t>
             </a:fld>
             <a:endParaRPr lang="en-US" dirty="0"/>
           </a:p>
@@ -8950,7 +8950,7 @@
             <a:fld id="{055373AC-9AA7-423B-BA00-BA1C74164DBD}" type="datetime1">
               <a:rPr lang="en-US" smtClean="0"/>
               <a:pPr/>
-              <a:t>3/11/2019</a:t>
+              <a:t>3/16/2019</a:t>
             </a:fld>
             <a:endParaRPr lang="en-US" dirty="0"/>
           </a:p>
@@ -9273,7 +9273,7 @@
             <a:fld id="{055373AC-9AA7-423B-BA00-BA1C74164DBD}" type="datetime1">
               <a:rPr lang="en-US" smtClean="0"/>
               <a:pPr/>
-              <a:t>3/11/2019</a:t>
+              <a:t>3/16/2019</a:t>
             </a:fld>
             <a:endParaRPr lang="en-US" dirty="0"/>
           </a:p>
@@ -9596,7 +9596,7 @@
             <a:fld id="{055373AC-9AA7-423B-BA00-BA1C74164DBD}" type="datetime1">
               <a:rPr lang="en-US" smtClean="0"/>
               <a:pPr/>
-              <a:t>3/11/2019</a:t>
+              <a:t>3/16/2019</a:t>
             </a:fld>
             <a:endParaRPr lang="en-US" dirty="0"/>
           </a:p>
@@ -9919,7 +9919,7 @@
             <a:fld id="{055373AC-9AA7-423B-BA00-BA1C74164DBD}" type="datetime1">
               <a:rPr lang="en-US" smtClean="0"/>
               <a:pPr/>
-              <a:t>3/11/2019</a:t>
+              <a:t>3/16/2019</a:t>
             </a:fld>
             <a:endParaRPr lang="en-US" dirty="0"/>
           </a:p>
@@ -10242,7 +10242,7 @@
             <a:fld id="{055373AC-9AA7-423B-BA00-BA1C74164DBD}" type="datetime1">
               <a:rPr lang="en-US" smtClean="0"/>
               <a:pPr/>
-              <a:t>3/11/2019</a:t>
+              <a:t>3/16/2019</a:t>
             </a:fld>
             <a:endParaRPr lang="en-US" dirty="0"/>
           </a:p>
@@ -10565,7 +10565,7 @@
             <a:fld id="{055373AC-9AA7-423B-BA00-BA1C74164DBD}" type="datetime1">
               <a:rPr lang="en-US" smtClean="0"/>
               <a:pPr/>
-              <a:t>3/11/2019</a:t>
+              <a:t>3/16/2019</a:t>
             </a:fld>
             <a:endParaRPr lang="en-US" dirty="0"/>
           </a:p>
@@ -10888,7 +10888,7 @@
             <a:fld id="{055373AC-9AA7-423B-BA00-BA1C74164DBD}" type="datetime1">
               <a:rPr lang="en-US" smtClean="0"/>
               <a:pPr/>
-              <a:t>3/11/2019</a:t>
+              <a:t>3/16/2019</a:t>
             </a:fld>
             <a:endParaRPr lang="en-US" dirty="0"/>
           </a:p>
@@ -11211,7 +11211,7 @@
             <a:fld id="{055373AC-9AA7-423B-BA00-BA1C74164DBD}" type="datetime1">
               <a:rPr lang="en-US" smtClean="0"/>
               <a:pPr/>
-              <a:t>3/11/2019</a:t>
+              <a:t>3/16/2019</a:t>
             </a:fld>
             <a:endParaRPr lang="en-US" dirty="0"/>
           </a:p>
@@ -11768,7 +11768,7 @@
             <a:fld id="{055373AC-9AA7-423B-BA00-BA1C74164DBD}" type="datetime1">
               <a:rPr lang="en-US" smtClean="0"/>
               <a:pPr/>
-              <a:t>3/11/2019</a:t>
+              <a:t>3/16/2019</a:t>
             </a:fld>
             <a:endParaRPr lang="en-US" dirty="0"/>
           </a:p>
@@ -12091,7 +12091,7 @@
             <a:fld id="{055373AC-9AA7-423B-BA00-BA1C74164DBD}" type="datetime1">
               <a:rPr lang="en-US" smtClean="0"/>
               <a:pPr/>
-              <a:t>3/11/2019</a:t>
+              <a:t>3/16/2019</a:t>
             </a:fld>
             <a:endParaRPr lang="en-US" dirty="0"/>
           </a:p>
@@ -12414,7 +12414,7 @@
             <a:fld id="{055373AC-9AA7-423B-BA00-BA1C74164DBD}" type="datetime1">
               <a:rPr lang="en-US" smtClean="0"/>
               <a:pPr/>
-              <a:t>3/11/2019</a:t>
+              <a:t>3/16/2019</a:t>
             </a:fld>
             <a:endParaRPr lang="en-US" dirty="0"/>
           </a:p>
@@ -12737,7 +12737,7 @@
             <a:fld id="{055373AC-9AA7-423B-BA00-BA1C74164DBD}" type="datetime1">
               <a:rPr lang="en-US" smtClean="0"/>
               <a:pPr/>
-              <a:t>3/11/2019</a:t>
+              <a:t>3/16/2019</a:t>
             </a:fld>
             <a:endParaRPr lang="en-US" dirty="0"/>
           </a:p>
@@ -13060,7 +13060,7 @@
             <a:fld id="{055373AC-9AA7-423B-BA00-BA1C74164DBD}" type="datetime1">
               <a:rPr lang="en-US" smtClean="0"/>
               <a:pPr/>
-              <a:t>3/11/2019</a:t>
+              <a:t>3/16/2019</a:t>
             </a:fld>
             <a:endParaRPr lang="en-US" dirty="0"/>
           </a:p>
@@ -13383,7 +13383,7 @@
             <a:fld id="{055373AC-9AA7-423B-BA00-BA1C74164DBD}" type="datetime1">
               <a:rPr lang="en-US" smtClean="0"/>
               <a:pPr/>
-              <a:t>3/11/2019</a:t>
+              <a:t>3/16/2019</a:t>
             </a:fld>
             <a:endParaRPr lang="en-US" dirty="0"/>
           </a:p>
@@ -13706,7 +13706,7 @@
             <a:fld id="{055373AC-9AA7-423B-BA00-BA1C74164DBD}" type="datetime1">
               <a:rPr lang="en-US" smtClean="0"/>
               <a:pPr/>
-              <a:t>3/11/2019</a:t>
+              <a:t>3/16/2019</a:t>
             </a:fld>
             <a:endParaRPr lang="en-US" dirty="0"/>
           </a:p>
@@ -14029,7 +14029,7 @@
             <a:fld id="{055373AC-9AA7-423B-BA00-BA1C74164DBD}" type="datetime1">
               <a:rPr lang="en-US" smtClean="0"/>
               <a:pPr/>
-              <a:t>3/11/2019</a:t>
+              <a:t>3/16/2019</a:t>
             </a:fld>
             <a:endParaRPr lang="en-US" dirty="0"/>
           </a:p>
@@ -14682,7 +14682,7 @@
             <a:fld id="{055373AC-9AA7-423B-BA00-BA1C74164DBD}" type="datetime1">
               <a:rPr lang="en-US" smtClean="0"/>
               <a:pPr/>
-              <a:t>3/11/2019</a:t>
+              <a:t>3/16/2019</a:t>
             </a:fld>
             <a:endParaRPr lang="en-US" dirty="0"/>
           </a:p>
@@ -15093,7 +15093,7 @@
             <a:fld id="{055373AC-9AA7-423B-BA00-BA1C74164DBD}" type="datetime1">
               <a:rPr lang="en-US" smtClean="0"/>
               <a:pPr/>
-              <a:t>3/11/2019</a:t>
+              <a:t>3/16/2019</a:t>
             </a:fld>
             <a:endParaRPr lang="en-US" dirty="0"/>
           </a:p>
@@ -15462,7 +15462,7 @@
             <a:fld id="{055373AC-9AA7-423B-BA00-BA1C74164DBD}" type="datetime1">
               <a:rPr lang="en-US" smtClean="0"/>
               <a:pPr/>
-              <a:t>3/11/2019</a:t>
+              <a:t>3/16/2019</a:t>
             </a:fld>
             <a:endParaRPr lang="en-US" dirty="0"/>
           </a:p>
@@ -16130,7 +16130,7 @@
             <a:fld id="{055373AC-9AA7-423B-BA00-BA1C74164DBD}" type="datetime1">
               <a:rPr lang="en-US" smtClean="0"/>
               <a:pPr/>
-              <a:t>3/11/2019</a:t>
+              <a:t>3/16/2019</a:t>
             </a:fld>
             <a:endParaRPr lang="en-US" dirty="0"/>
           </a:p>
@@ -16591,7 +16591,7 @@
             <a:fld id="{055373AC-9AA7-423B-BA00-BA1C74164DBD}" type="datetime1">
               <a:rPr lang="en-US" smtClean="0"/>
               <a:pPr/>
-              <a:t>3/11/2019</a:t>
+              <a:t>3/16/2019</a:t>
             </a:fld>
             <a:endParaRPr lang="en-US" dirty="0"/>
           </a:p>
@@ -16775,7 +16775,7 @@
             <a:fld id="{055373AC-9AA7-423B-BA00-BA1C74164DBD}" type="datetime1">
               <a:rPr lang="en-US" smtClean="0"/>
               <a:pPr/>
-              <a:t>3/11/2019</a:t>
+              <a:t>3/16/2019</a:t>
             </a:fld>
             <a:endParaRPr lang="en-US" dirty="0"/>
           </a:p>
@@ -17376,10 +17376,9 @@
           <a:lstStyle/>
           <a:p>
             <a:r>
-              <a:rPr lang="en-US" noProof="1" smtClean="0"/>
+              <a:rPr lang="en-US" noProof="1"/>
               <a:t>Thymeleaf Helpers, Validators</a:t>
             </a:r>
-            <a:endParaRPr lang="en-US" noProof="1"/>
           </a:p>
         </p:txBody>
       </p:sp>
@@ -17410,14 +17409,13 @@
           <a:lstStyle/>
           <a:p>
             <a:r>
-              <a:rPr lang="en-US" dirty="0" err="1" smtClean="0"/>
+              <a:rPr lang="en-US" dirty="0" err="1"/>
               <a:t>Thymeleaf</a:t>
             </a:r>
             <a:r>
-              <a:rPr lang="en-US" dirty="0" smtClean="0"/>
+              <a:rPr lang="en-US" dirty="0"/>
               <a:t> &amp; Controllers</a:t>
             </a:r>
-            <a:endParaRPr lang="en-US" dirty="0"/>
           </a:p>
         </p:txBody>
       </p:sp>
@@ -27128,11 +27126,11 @@
               <a:buAutoNum type="arabicPeriod"/>
             </a:pPr>
             <a:r>
-              <a:rPr lang="en-US" dirty="0" err="1" smtClean="0"/>
+              <a:rPr lang="en-US" dirty="0" err="1"/>
               <a:t>Thymeleaf</a:t>
             </a:r>
             <a:r>
-              <a:rPr lang="en-US" dirty="0" smtClean="0"/>
+              <a:rPr lang="en-US" dirty="0"/>
               <a:t> Helpers</a:t>
             </a:r>
           </a:p>
@@ -27143,7 +27141,7 @@
               </a:lnSpc>
             </a:pPr>
             <a:r>
-              <a:rPr lang="en-US" dirty="0" smtClean="0"/>
+              <a:rPr lang="en-US" dirty="0"/>
               <a:t>Dates</a:t>
             </a:r>
           </a:p>
@@ -27154,7 +27152,7 @@
               </a:lnSpc>
             </a:pPr>
             <a:r>
-              <a:rPr lang="en-US" dirty="0" smtClean="0"/>
+              <a:rPr lang="en-US" dirty="0"/>
               <a:t>Strings</a:t>
             </a:r>
           </a:p>
@@ -27165,7 +27163,7 @@
               </a:lnSpc>
             </a:pPr>
             <a:r>
-              <a:rPr lang="en-US" dirty="0" smtClean="0"/>
+              <a:rPr lang="en-US" dirty="0"/>
               <a:t>Numbers</a:t>
             </a:r>
           </a:p>
@@ -27176,7 +27174,7 @@
               </a:lnSpc>
             </a:pPr>
             <a:r>
-              <a:rPr lang="en-US" dirty="0" smtClean="0"/>
+              <a:rPr lang="en-US" dirty="0"/>
               <a:t>Aggregates</a:t>
             </a:r>
           </a:p>
@@ -27187,10 +27185,9 @@
               </a:lnSpc>
             </a:pPr>
             <a:r>
-              <a:rPr lang="en-US" dirty="0" smtClean="0"/>
+              <a:rPr lang="en-US" dirty="0"/>
               <a:t>Validations</a:t>
             </a:r>
-            <a:endParaRPr lang="en-US" dirty="0"/>
           </a:p>
         </p:txBody>
       </p:sp>
@@ -29040,18 +29037,15 @@
                 <a:latin typeface="Consolas" pitchFamily="49" charset="0"/>
                 <a:cs typeface="Consolas" pitchFamily="49" charset="0"/>
               </a:rPr>
-              <a:t>}</a:t>
-            </a:r>
-            <a:r>
-              <a:rPr lang="en-US" b="1" noProof="1">
-                <a:solidFill>
-                  <a:schemeClr val="tx2"/>
-                </a:solidFill>
-                <a:latin typeface="Consolas" pitchFamily="49" charset="0"/>
-                <a:cs typeface="Consolas" pitchFamily="49" charset="0"/>
-              </a:rPr>
-              <a:t>“</a:t>
-            </a:r>
+              <a:t>}"</a:t>
+            </a:r>
+            <a:endParaRPr lang="en-US" b="1" noProof="1">
+              <a:solidFill>
+                <a:schemeClr val="tx2"/>
+              </a:solidFill>
+              <a:latin typeface="Consolas" pitchFamily="49" charset="0"/>
+              <a:cs typeface="Consolas" pitchFamily="49" charset="0"/>
+            </a:endParaRPr>
           </a:p>
           <a:p>
             <a:pPr eaLnBrk="0" hangingPunct="0">
@@ -32509,28 +32503,16 @@
           <a:p>
             <a:r>
               <a:rPr lang="en-US" sz="3200" dirty="0"/>
-              <a:t>Objects that provide built-in functionalities that helps you </a:t>
-            </a:r>
-            <a:r>
-              <a:rPr lang="en-US" sz="3200" dirty="0" smtClean="0"/>
-              <a:t>enhance </a:t>
+              <a:t>Objects that provide built-in functionalities that helps you enhance your view</a:t>
+            </a:r>
+          </a:p>
+          <a:p>
+            <a:r>
+              <a:rPr lang="en-US" sz="3200" dirty="0" err="1"/>
+              <a:t>Thymeleaf</a:t>
             </a:r>
             <a:r>
               <a:rPr lang="en-US" sz="3200" dirty="0"/>
-              <a:t>your </a:t>
-            </a:r>
-            <a:r>
-              <a:rPr lang="en-US" sz="3200" dirty="0" smtClean="0"/>
-              <a:t>view</a:t>
-            </a:r>
-          </a:p>
-          <a:p>
-            <a:r>
-              <a:rPr lang="en-US" sz="3200" dirty="0" err="1" smtClean="0"/>
-              <a:t>Thymeleaf</a:t>
-            </a:r>
-            <a:r>
-              <a:rPr lang="en-US" sz="3200" dirty="0" smtClean="0"/>
               <a:t> provides helpers and validations</a:t>
             </a:r>
           </a:p>
@@ -32568,10 +32550,10 @@
             <a:pPr marL="0" indent="0">
               <a:buNone/>
             </a:pPr>
-            <a:endParaRPr lang="en-US" sz="3200" dirty="0" smtClean="0"/>
-          </a:p>
-          <a:p>
-            <a:endParaRPr lang="en-US" sz="3200" dirty="0" smtClean="0"/>
+            <a:endParaRPr lang="en-US" sz="3200" dirty="0"/>
+          </a:p>
+          <a:p>
+            <a:endParaRPr lang="en-US" sz="3200" dirty="0"/>
           </a:p>
           <a:p>
             <a:endParaRPr lang="bg-BG" sz="3200" dirty="0"/>
@@ -32713,13 +32695,6 @@
       <p:transition/>
     </mc:Fallback>
   </mc:AlternateContent>
-  <p:timing>
-    <p:tnLst>
-      <p:par>
-        <p:cTn id="1" dur="indefinite" restart="never" nodeType="tmRoot"/>
-      </p:par>
-    </p:tnLst>
-  </p:timing>
 </p:sld>
 </file>
 
@@ -34124,10 +34099,6 @@
                 </a:solidFill>
               </a:rPr>
               <a:t>sli.do</a:t>
-            </a:r>
-            <a:r>
-              <a:rPr lang="en-US" sz="5400" b="1" dirty="0"/>
-              <a:t/>
             </a:r>
             <a:br>
               <a:rPr lang="en-US" sz="5400" b="1" dirty="0"/>
@@ -34571,15 +34542,7 @@
           <a:p>
             <a:r>
               <a:rPr lang="en-US" dirty="0"/>
-              <a:t>Objects that provide built-in functionalities that helps you </a:t>
-            </a:r>
-            <a:r>
-              <a:rPr lang="en-US" dirty="0" smtClean="0"/>
-              <a:t>        enhance </a:t>
-            </a:r>
-            <a:r>
-              <a:rPr lang="en-US" dirty="0"/>
-              <a:t>your view</a:t>
+              <a:t>Objects that provide built-in functionalities that helps you         enhance your view</a:t>
             </a:r>
             <a:endParaRPr lang="bg-BG" dirty="0"/>
           </a:p>

</xml_diff>